<commit_message>
Update Command Design Pattern.pptx
</commit_message>
<xml_diff>
--- a/Design Patterns/Command Design Pattern.pptx
+++ b/Design Patterns/Command Design Pattern.pptx
@@ -609,7 +609,90 @@
           <a:bodyPr/>
           <a:lstStyle/>
           <a:p>
-            <a:endParaRPr lang="en-US" dirty="0"/>
+            <a:r>
+              <a:rPr lang="en-US" sz="1200" b="0" i="0" kern="1200" dirty="0">
+                <a:solidFill>
+                  <a:schemeClr val="tx1"/>
+                </a:solidFill>
+                <a:effectLst/>
+                <a:latin typeface="+mn-lt"/>
+                <a:ea typeface="+mn-ea"/>
+                <a:cs typeface="+mn-cs"/>
+              </a:rPr>
+              <a:t>Command declares an interface for all commands, providing a simple execute() method which asks the Receiver of the command to carry out an operation. The Receiver has the knowledge of what to do to carry out the request.  The Caller holds a command and can get the Command to execute a request by calling the execute method. The Client creates </a:t>
+            </a:r>
+            <a:r>
+              <a:rPr lang="en-US" sz="1200" b="0" i="0" kern="1200" dirty="0" err="1">
+                <a:solidFill>
+                  <a:schemeClr val="tx1"/>
+                </a:solidFill>
+                <a:effectLst/>
+                <a:latin typeface="+mn-lt"/>
+                <a:ea typeface="+mn-ea"/>
+                <a:cs typeface="+mn-cs"/>
+              </a:rPr>
+              <a:t>ConcreteCommands</a:t>
+            </a:r>
+            <a:r>
+              <a:rPr lang="en-US" sz="1200" b="0" i="0" kern="1200" dirty="0">
+                <a:solidFill>
+                  <a:schemeClr val="tx1"/>
+                </a:solidFill>
+                <a:effectLst/>
+                <a:latin typeface="+mn-lt"/>
+                <a:ea typeface="+mn-ea"/>
+                <a:cs typeface="+mn-cs"/>
+              </a:rPr>
+              <a:t> and sets a Receiver for the command. The </a:t>
+            </a:r>
+            <a:r>
+              <a:rPr lang="en-US" sz="1200" b="0" i="0" kern="1200" dirty="0" err="1">
+                <a:solidFill>
+                  <a:schemeClr val="tx1"/>
+                </a:solidFill>
+                <a:effectLst/>
+                <a:latin typeface="+mn-lt"/>
+                <a:ea typeface="+mn-ea"/>
+                <a:cs typeface="+mn-cs"/>
+              </a:rPr>
+              <a:t>ConcreteCommand</a:t>
+            </a:r>
+            <a:r>
+              <a:rPr lang="en-US" sz="1200" b="0" i="0" kern="1200" dirty="0">
+                <a:solidFill>
+                  <a:schemeClr val="tx1"/>
+                </a:solidFill>
+                <a:effectLst/>
+                <a:latin typeface="+mn-lt"/>
+                <a:ea typeface="+mn-ea"/>
+                <a:cs typeface="+mn-cs"/>
+              </a:rPr>
+              <a:t> defines a binding between the action and the receiver. When the Caller calls execute the </a:t>
+            </a:r>
+            <a:r>
+              <a:rPr lang="en-US" sz="1200" b="0" i="0" kern="1200" dirty="0" err="1">
+                <a:solidFill>
+                  <a:schemeClr val="tx1"/>
+                </a:solidFill>
+                <a:effectLst/>
+                <a:latin typeface="+mn-lt"/>
+                <a:ea typeface="+mn-ea"/>
+                <a:cs typeface="+mn-cs"/>
+              </a:rPr>
+              <a:t>ConcreteCommand</a:t>
+            </a:r>
+            <a:r>
+              <a:rPr lang="en-US" sz="1200" b="0" i="0" kern="1200" dirty="0">
+                <a:solidFill>
+                  <a:schemeClr val="tx1"/>
+                </a:solidFill>
+                <a:effectLst/>
+                <a:latin typeface="+mn-lt"/>
+                <a:ea typeface="+mn-ea"/>
+                <a:cs typeface="+mn-cs"/>
+              </a:rPr>
+              <a:t> will run one or more actions on the Receiver.</a:t>
+            </a:r>
           </a:p>
         </p:txBody>
       </p:sp>
@@ -693,6 +776,67 @@
           <a:bodyPr/>
           <a:lstStyle/>
           <a:p>
+            <a:r>
+              <a:rPr lang="en-US" dirty="0"/>
+              <a:t>First, we have our command interface which holds all commands.</a:t>
+            </a:r>
+          </a:p>
+          <a:p>
+            <a:endParaRPr lang="en-US" dirty="0"/>
+          </a:p>
+          <a:p>
+            <a:r>
+              <a:rPr lang="en-US" dirty="0"/>
+              <a:t>Next, the </a:t>
+            </a:r>
+            <a:r>
+              <a:rPr lang="en-US" dirty="0" err="1"/>
+              <a:t>concretecommand</a:t>
+            </a:r>
+            <a:r>
+              <a:rPr lang="en-US" dirty="0"/>
+              <a:t> class </a:t>
+            </a:r>
+            <a:r>
+              <a:rPr lang="en-US" dirty="0" err="1"/>
+              <a:t>LightsOnCommand</a:t>
+            </a:r>
+            <a:r>
+              <a:rPr lang="en-US" dirty="0"/>
+              <a:t>, extends command in this case to turn lights on and off.</a:t>
+            </a:r>
+          </a:p>
+          <a:p>
+            <a:endParaRPr lang="en-US" dirty="0"/>
+          </a:p>
+          <a:p>
+            <a:r>
+              <a:rPr lang="en-US" dirty="0"/>
+              <a:t>Then our receiver class contains the logic to carry out the command.</a:t>
+            </a:r>
+          </a:p>
+          <a:p>
+            <a:endParaRPr lang="en-US" dirty="0"/>
+          </a:p>
+          <a:p>
+            <a:r>
+              <a:rPr lang="en-US" dirty="0"/>
+              <a:t>Our Invoker, or caller, in this case is a remote control which gets the command to execute by calling the execute method.</a:t>
+            </a:r>
+          </a:p>
+          <a:p>
+            <a:endParaRPr lang="en-US" dirty="0"/>
+          </a:p>
+          <a:p>
+            <a:r>
+              <a:rPr lang="en-US" dirty="0"/>
+              <a:t>Lastly, the client class is set up to use the caller class to invoke the command.</a:t>
+            </a:r>
+          </a:p>
+          <a:p>
+            <a:endParaRPr lang="en-US" dirty="0"/>
+          </a:p>
+          <a:p>
             <a:endParaRPr lang="en-US" dirty="0"/>
           </a:p>
         </p:txBody>
@@ -783,8 +927,21 @@
             </a:pPr>
             <a:r>
               <a:rPr lang="en-US" dirty="0"/>
-              <a:t>Abstraction and Implementation</a:t>
+              <a:t>Yes, this </a:t>
             </a:r>
+            <a:r>
+              <a:rPr lang="en-US" sz="1200" b="0" i="0" kern="1200" dirty="0">
+                <a:solidFill>
+                  <a:schemeClr val="tx1"/>
+                </a:solidFill>
+                <a:effectLst/>
+                <a:latin typeface="+mn-lt"/>
+                <a:ea typeface="+mn-ea"/>
+                <a:cs typeface="+mn-cs"/>
+              </a:rPr>
+              <a:t>allows clients to be parametrized with different requests</a:t>
+            </a:r>
+            <a:endParaRPr lang="en-US" dirty="0"/>
           </a:p>
           <a:p>
             <a:pPr marL="171450" indent="-171450">
@@ -793,7 +950,19 @@
             </a:pPr>
             <a:r>
               <a:rPr lang="en-US" dirty="0"/>
-              <a:t>No, this is the main benefit of the Bridge Design Pattern.</a:t>
+              <a:t>No, </a:t>
+            </a:r>
+            <a:r>
+              <a:rPr lang="en-US" sz="1200" b="0" i="0" kern="1200" dirty="0">
+                <a:solidFill>
+                  <a:schemeClr val="tx1"/>
+                </a:solidFill>
+                <a:effectLst/>
+                <a:latin typeface="+mn-lt"/>
+                <a:ea typeface="+mn-ea"/>
+                <a:cs typeface="+mn-cs"/>
+              </a:rPr>
+              <a:t> commands are created by one client that knows what need to be done (client), and passed to another client that has the resources for doing it (receiver).</a:t>
             </a:r>
           </a:p>
           <a:p>
@@ -811,33 +980,8 @@
                 <a:ea typeface="+mn-ea"/>
                 <a:cs typeface="+mn-cs"/>
               </a:rPr>
-              <a:t>The Abstraction</a:t>
+              <a:t>Accepts the request and performs a specific action on it.</a:t>
             </a:r>
-            <a:r>
-              <a:rPr lang="en-US" sz="1200" b="1" i="0" kern="1200" dirty="0">
-                <a:solidFill>
-                  <a:schemeClr val="tx1"/>
-                </a:solidFill>
-                <a:effectLst/>
-                <a:latin typeface="+mn-lt"/>
-                <a:ea typeface="+mn-ea"/>
-                <a:cs typeface="+mn-cs"/>
-              </a:rPr>
-              <a:t> </a:t>
-            </a:r>
-            <a:r>
-              <a:rPr lang="en-US" sz="1200" b="0" i="0" kern="1200" dirty="0">
-                <a:solidFill>
-                  <a:schemeClr val="tx1"/>
-                </a:solidFill>
-                <a:effectLst/>
-                <a:latin typeface="+mn-lt"/>
-                <a:ea typeface="+mn-ea"/>
-                <a:cs typeface="+mn-cs"/>
-              </a:rPr>
-              <a:t>provides high-level control logic and relies on the implementation object to do the actual low-level work.</a:t>
-            </a:r>
-            <a:endParaRPr lang="en-US" dirty="0"/>
           </a:p>
         </p:txBody>
       </p:sp>
@@ -1018,7 +1162,7 @@
           <a:noFill/>
           <a:extLst>
             <a:ext uri="{909E8E84-426E-40dd-AFC4-6F175D3DCCD1}">
-              <a14:hiddenFill xmlns="" xmlns:a14="http://schemas.microsoft.com/office/drawing/2010/main">
+              <a14:hiddenFill xmlns:a14="http://schemas.microsoft.com/office/drawing/2010/main" xmlns="">
                 <a:solidFill>
                   <a:srgbClr val="FFFFFF"/>
                 </a:solidFill>
@@ -1077,7 +1221,7 @@
             </a:ln>
             <a:extLst>
               <a:ext uri="{91240B29-F687-4f45-9708-019B960494DF}">
-                <a14:hiddenLine xmlns="" xmlns:a14="http://schemas.microsoft.com/office/drawing/2010/main" w="9525">
+                <a14:hiddenLine xmlns:a14="http://schemas.microsoft.com/office/drawing/2010/main" xmlns="" w="9525">
                   <a:solidFill>
                     <a:srgbClr val="000000"/>
                   </a:solidFill>
@@ -1167,7 +1311,7 @@
             </a:ln>
             <a:extLst>
               <a:ext uri="{91240B29-F687-4f45-9708-019B960494DF}">
-                <a14:hiddenLine xmlns="" xmlns:a14="http://schemas.microsoft.com/office/drawing/2010/main" w="9525">
+                <a14:hiddenLine xmlns:a14="http://schemas.microsoft.com/office/drawing/2010/main" xmlns="" w="9525">
                   <a:solidFill>
                     <a:srgbClr val="000000"/>
                   </a:solidFill>
@@ -1257,7 +1401,7 @@
             </a:ln>
             <a:extLst>
               <a:ext uri="{91240B29-F687-4f45-9708-019B960494DF}">
-                <a14:hiddenLine xmlns="" xmlns:a14="http://schemas.microsoft.com/office/drawing/2010/main" w="9525">
+                <a14:hiddenLine xmlns:a14="http://schemas.microsoft.com/office/drawing/2010/main" xmlns="" w="9525">
                   <a:solidFill>
                     <a:srgbClr val="000000"/>
                   </a:solidFill>
@@ -1291,7 +1435,7 @@
             </a:ln>
             <a:extLst>
               <a:ext uri="{91240B29-F687-4f45-9708-019B960494DF}">
-                <a14:hiddenLine xmlns="" xmlns:a14="http://schemas.microsoft.com/office/drawing/2010/main" w="9525">
+                <a14:hiddenLine xmlns:a14="http://schemas.microsoft.com/office/drawing/2010/main" xmlns="" w="9525">
                   <a:solidFill>
                     <a:srgbClr val="000000"/>
                   </a:solidFill>
@@ -1381,7 +1525,7 @@
             </a:ln>
             <a:extLst>
               <a:ext uri="{91240B29-F687-4f45-9708-019B960494DF}">
-                <a14:hiddenLine xmlns="" xmlns:a14="http://schemas.microsoft.com/office/drawing/2010/main" w="9525">
+                <a14:hiddenLine xmlns:a14="http://schemas.microsoft.com/office/drawing/2010/main" xmlns="" w="9525">
                   <a:solidFill>
                     <a:srgbClr val="000000"/>
                   </a:solidFill>
@@ -1443,7 +1587,7 @@
             </a:ln>
             <a:extLst>
               <a:ext uri="{91240B29-F687-4f45-9708-019B960494DF}">
-                <a14:hiddenLine xmlns="" xmlns:a14="http://schemas.microsoft.com/office/drawing/2010/main" w="9525">
+                <a14:hiddenLine xmlns:a14="http://schemas.microsoft.com/office/drawing/2010/main" xmlns="" w="9525">
                   <a:solidFill>
                     <a:srgbClr val="000000"/>
                   </a:solidFill>
@@ -1505,7 +1649,7 @@
             </a:ln>
             <a:extLst>
               <a:ext uri="{91240B29-F687-4f45-9708-019B960494DF}">
-                <a14:hiddenLine xmlns="" xmlns:a14="http://schemas.microsoft.com/office/drawing/2010/main" w="9525">
+                <a14:hiddenLine xmlns:a14="http://schemas.microsoft.com/office/drawing/2010/main" xmlns="" w="9525">
                   <a:solidFill>
                     <a:srgbClr val="000000"/>
                   </a:solidFill>
@@ -1595,7 +1739,7 @@
             </a:ln>
             <a:extLst>
               <a:ext uri="{91240B29-F687-4f45-9708-019B960494DF}">
-                <a14:hiddenLine xmlns="" xmlns:a14="http://schemas.microsoft.com/office/drawing/2010/main" w="9525">
+                <a14:hiddenLine xmlns:a14="http://schemas.microsoft.com/office/drawing/2010/main" xmlns="" w="9525">
                   <a:solidFill>
                     <a:srgbClr val="000000"/>
                   </a:solidFill>
@@ -1657,7 +1801,7 @@
             </a:ln>
             <a:extLst>
               <a:ext uri="{91240B29-F687-4f45-9708-019B960494DF}">
-                <a14:hiddenLine xmlns="" xmlns:a14="http://schemas.microsoft.com/office/drawing/2010/main" w="9525">
+                <a14:hiddenLine xmlns:a14="http://schemas.microsoft.com/office/drawing/2010/main" xmlns="" w="9525">
                   <a:solidFill>
                     <a:srgbClr val="000000"/>
                   </a:solidFill>
@@ -1719,7 +1863,7 @@
             </a:ln>
             <a:extLst>
               <a:ext uri="{91240B29-F687-4f45-9708-019B960494DF}">
-                <a14:hiddenLine xmlns="" xmlns:a14="http://schemas.microsoft.com/office/drawing/2010/main" w="9525">
+                <a14:hiddenLine xmlns:a14="http://schemas.microsoft.com/office/drawing/2010/main" xmlns="" w="9525">
                   <a:solidFill>
                     <a:srgbClr val="000000"/>
                   </a:solidFill>
@@ -1809,7 +1953,7 @@
             </a:ln>
             <a:extLst>
               <a:ext uri="{91240B29-F687-4f45-9708-019B960494DF}">
-                <a14:hiddenLine xmlns="" xmlns:a14="http://schemas.microsoft.com/office/drawing/2010/main" w="9525">
+                <a14:hiddenLine xmlns:a14="http://schemas.microsoft.com/office/drawing/2010/main" xmlns="" w="9525">
                   <a:solidFill>
                     <a:srgbClr val="000000"/>
                   </a:solidFill>
@@ -1899,7 +2043,7 @@
             </a:ln>
             <a:extLst>
               <a:ext uri="{91240B29-F687-4f45-9708-019B960494DF}">
-                <a14:hiddenLine xmlns="" xmlns:a14="http://schemas.microsoft.com/office/drawing/2010/main" w="9525">
+                <a14:hiddenLine xmlns:a14="http://schemas.microsoft.com/office/drawing/2010/main" xmlns="" w="9525">
                   <a:solidFill>
                     <a:srgbClr val="000000"/>
                   </a:solidFill>
@@ -1961,7 +2105,7 @@
             </a:ln>
             <a:extLst>
               <a:ext uri="{91240B29-F687-4f45-9708-019B960494DF}">
-                <a14:hiddenLine xmlns="" xmlns:a14="http://schemas.microsoft.com/office/drawing/2010/main" w="9525">
+                <a14:hiddenLine xmlns:a14="http://schemas.microsoft.com/office/drawing/2010/main" xmlns="" w="9525">
                   <a:solidFill>
                     <a:srgbClr val="000000"/>
                   </a:solidFill>
@@ -2071,7 +2215,7 @@
             </a:ln>
             <a:extLst>
               <a:ext uri="{91240B29-F687-4f45-9708-019B960494DF}">
-                <a14:hiddenLine xmlns="" xmlns:a14="http://schemas.microsoft.com/office/drawing/2010/main" w="9525">
+                <a14:hiddenLine xmlns:a14="http://schemas.microsoft.com/office/drawing/2010/main" xmlns="" w="9525">
                   <a:solidFill>
                     <a:srgbClr val="000000"/>
                   </a:solidFill>
@@ -2133,7 +2277,7 @@
             </a:ln>
             <a:extLst>
               <a:ext uri="{91240B29-F687-4f45-9708-019B960494DF}">
-                <a14:hiddenLine xmlns="" xmlns:a14="http://schemas.microsoft.com/office/drawing/2010/main" w="9525">
+                <a14:hiddenLine xmlns:a14="http://schemas.microsoft.com/office/drawing/2010/main" xmlns="" w="9525">
                   <a:solidFill>
                     <a:srgbClr val="000000"/>
                   </a:solidFill>
@@ -2223,7 +2367,7 @@
             </a:ln>
             <a:extLst>
               <a:ext uri="{91240B29-F687-4f45-9708-019B960494DF}">
-                <a14:hiddenLine xmlns="" xmlns:a14="http://schemas.microsoft.com/office/drawing/2010/main" w="9525">
+                <a14:hiddenLine xmlns:a14="http://schemas.microsoft.com/office/drawing/2010/main" xmlns="" w="9525">
                   <a:solidFill>
                     <a:srgbClr val="000000"/>
                   </a:solidFill>
@@ -2313,7 +2457,7 @@
             </a:ln>
             <a:extLst>
               <a:ext uri="{91240B29-F687-4f45-9708-019B960494DF}">
-                <a14:hiddenLine xmlns="" xmlns:a14="http://schemas.microsoft.com/office/drawing/2010/main" w="9525">
+                <a14:hiddenLine xmlns:a14="http://schemas.microsoft.com/office/drawing/2010/main" xmlns="" w="9525">
                   <a:solidFill>
                     <a:srgbClr val="000000"/>
                   </a:solidFill>
@@ -2375,7 +2519,7 @@
             </a:ln>
             <a:extLst>
               <a:ext uri="{91240B29-F687-4f45-9708-019B960494DF}">
-                <a14:hiddenLine xmlns="" xmlns:a14="http://schemas.microsoft.com/office/drawing/2010/main" w="9525">
+                <a14:hiddenLine xmlns:a14="http://schemas.microsoft.com/office/drawing/2010/main" xmlns="" w="9525">
                   <a:solidFill>
                     <a:srgbClr val="000000"/>
                   </a:solidFill>
@@ -2465,7 +2609,7 @@
             </a:ln>
             <a:extLst>
               <a:ext uri="{91240B29-F687-4f45-9708-019B960494DF}">
-                <a14:hiddenLine xmlns="" xmlns:a14="http://schemas.microsoft.com/office/drawing/2010/main" w="9525">
+                <a14:hiddenLine xmlns:a14="http://schemas.microsoft.com/office/drawing/2010/main" xmlns="" w="9525">
                   <a:solidFill>
                     <a:srgbClr val="000000"/>
                   </a:solidFill>
@@ -2555,7 +2699,7 @@
             </a:ln>
             <a:extLst>
               <a:ext uri="{91240B29-F687-4f45-9708-019B960494DF}">
-                <a14:hiddenLine xmlns="" xmlns:a14="http://schemas.microsoft.com/office/drawing/2010/main" w="9525">
+                <a14:hiddenLine xmlns:a14="http://schemas.microsoft.com/office/drawing/2010/main" xmlns="" w="9525">
                   <a:solidFill>
                     <a:srgbClr val="000000"/>
                   </a:solidFill>
@@ -2611,7 +2755,7 @@
             </a:ln>
             <a:extLst>
               <a:ext uri="{91240B29-F687-4f45-9708-019B960494DF}">
-                <a14:hiddenLine xmlns="" xmlns:a14="http://schemas.microsoft.com/office/drawing/2010/main" w="9525">
+                <a14:hiddenLine xmlns:a14="http://schemas.microsoft.com/office/drawing/2010/main" xmlns="" w="9525">
                   <a:solidFill>
                     <a:srgbClr val="000000"/>
                   </a:solidFill>
@@ -2701,7 +2845,7 @@
             </a:ln>
             <a:extLst>
               <a:ext uri="{91240B29-F687-4f45-9708-019B960494DF}">
-                <a14:hiddenLine xmlns="" xmlns:a14="http://schemas.microsoft.com/office/drawing/2010/main" w="9525">
+                <a14:hiddenLine xmlns:a14="http://schemas.microsoft.com/office/drawing/2010/main" xmlns="" w="9525">
                   <a:solidFill>
                     <a:srgbClr val="000000"/>
                   </a:solidFill>
@@ -2757,7 +2901,7 @@
             </a:ln>
             <a:extLst>
               <a:ext uri="{91240B29-F687-4f45-9708-019B960494DF}">
-                <a14:hiddenLine xmlns="" xmlns:a14="http://schemas.microsoft.com/office/drawing/2010/main" w="9525">
+                <a14:hiddenLine xmlns:a14="http://schemas.microsoft.com/office/drawing/2010/main" xmlns="" w="9525">
                   <a:solidFill>
                     <a:srgbClr val="000000"/>
                   </a:solidFill>
@@ -2847,7 +2991,7 @@
             </a:ln>
             <a:extLst>
               <a:ext uri="{91240B29-F687-4f45-9708-019B960494DF}">
-                <a14:hiddenLine xmlns="" xmlns:a14="http://schemas.microsoft.com/office/drawing/2010/main" w="9525">
+                <a14:hiddenLine xmlns:a14="http://schemas.microsoft.com/office/drawing/2010/main" xmlns="" w="9525">
                   <a:solidFill>
                     <a:srgbClr val="000000"/>
                   </a:solidFill>
@@ -2915,7 +3059,7 @@
             </a:ln>
             <a:extLst>
               <a:ext uri="{91240B29-F687-4f45-9708-019B960494DF}">
-                <a14:hiddenLine xmlns="" xmlns:a14="http://schemas.microsoft.com/office/drawing/2010/main" w="9525">
+                <a14:hiddenLine xmlns:a14="http://schemas.microsoft.com/office/drawing/2010/main" xmlns="" w="9525">
                   <a:solidFill>
                     <a:srgbClr val="000000"/>
                   </a:solidFill>
@@ -3005,7 +3149,7 @@
             </a:ln>
             <a:extLst>
               <a:ext uri="{91240B29-F687-4f45-9708-019B960494DF}">
-                <a14:hiddenLine xmlns="" xmlns:a14="http://schemas.microsoft.com/office/drawing/2010/main" w="9525">
+                <a14:hiddenLine xmlns:a14="http://schemas.microsoft.com/office/drawing/2010/main" xmlns="" w="9525">
                   <a:solidFill>
                     <a:srgbClr val="000000"/>
                   </a:solidFill>
@@ -3073,7 +3217,7 @@
             </a:ln>
             <a:extLst>
               <a:ext uri="{91240B29-F687-4f45-9708-019B960494DF}">
-                <a14:hiddenLine xmlns="" xmlns:a14="http://schemas.microsoft.com/office/drawing/2010/main" w="9525">
+                <a14:hiddenLine xmlns:a14="http://schemas.microsoft.com/office/drawing/2010/main" xmlns="" w="9525">
                   <a:solidFill>
                     <a:srgbClr val="000000"/>
                   </a:solidFill>
@@ -3163,7 +3307,7 @@
             </a:ln>
             <a:extLst>
               <a:ext uri="{91240B29-F687-4f45-9708-019B960494DF}">
-                <a14:hiddenLine xmlns="" xmlns:a14="http://schemas.microsoft.com/office/drawing/2010/main" w="9525">
+                <a14:hiddenLine xmlns:a14="http://schemas.microsoft.com/office/drawing/2010/main" xmlns="" w="9525">
                   <a:solidFill>
                     <a:srgbClr val="000000"/>
                   </a:solidFill>
@@ -3197,7 +3341,7 @@
             </a:ln>
             <a:extLst>
               <a:ext uri="{91240B29-F687-4f45-9708-019B960494DF}">
-                <a14:hiddenLine xmlns="" xmlns:a14="http://schemas.microsoft.com/office/drawing/2010/main" w="9525">
+                <a14:hiddenLine xmlns:a14="http://schemas.microsoft.com/office/drawing/2010/main" xmlns="" w="9525">
                   <a:solidFill>
                     <a:srgbClr val="000000"/>
                   </a:solidFill>
@@ -3287,7 +3431,7 @@
             </a:ln>
             <a:extLst>
               <a:ext uri="{91240B29-F687-4f45-9708-019B960494DF}">
-                <a14:hiddenLine xmlns="" xmlns:a14="http://schemas.microsoft.com/office/drawing/2010/main" w="9525">
+                <a14:hiddenLine xmlns:a14="http://schemas.microsoft.com/office/drawing/2010/main" xmlns="" w="9525">
                   <a:solidFill>
                     <a:srgbClr val="000000"/>
                   </a:solidFill>
@@ -3349,7 +3493,7 @@
             </a:ln>
             <a:extLst>
               <a:ext uri="{91240B29-F687-4f45-9708-019B960494DF}">
-                <a14:hiddenLine xmlns="" xmlns:a14="http://schemas.microsoft.com/office/drawing/2010/main" w="9525">
+                <a14:hiddenLine xmlns:a14="http://schemas.microsoft.com/office/drawing/2010/main" xmlns="" w="9525">
                   <a:solidFill>
                     <a:srgbClr val="000000"/>
                   </a:solidFill>
@@ -3411,7 +3555,7 @@
             </a:ln>
             <a:extLst>
               <a:ext uri="{91240B29-F687-4f45-9708-019B960494DF}">
-                <a14:hiddenLine xmlns="" xmlns:a14="http://schemas.microsoft.com/office/drawing/2010/main" w="9525">
+                <a14:hiddenLine xmlns:a14="http://schemas.microsoft.com/office/drawing/2010/main" xmlns="" w="9525">
                   <a:solidFill>
                     <a:srgbClr val="000000"/>
                   </a:solidFill>
@@ -3501,7 +3645,7 @@
             </a:ln>
             <a:extLst>
               <a:ext uri="{91240B29-F687-4f45-9708-019B960494DF}">
-                <a14:hiddenLine xmlns="" xmlns:a14="http://schemas.microsoft.com/office/drawing/2010/main" w="9525">
+                <a14:hiddenLine xmlns:a14="http://schemas.microsoft.com/office/drawing/2010/main" xmlns="" w="9525">
                   <a:solidFill>
                     <a:srgbClr val="000000"/>
                   </a:solidFill>
@@ -3569,7 +3713,7 @@
             </a:ln>
             <a:extLst>
               <a:ext uri="{91240B29-F687-4f45-9708-019B960494DF}">
-                <a14:hiddenLine xmlns="" xmlns:a14="http://schemas.microsoft.com/office/drawing/2010/main" w="9525">
+                <a14:hiddenLine xmlns:a14="http://schemas.microsoft.com/office/drawing/2010/main" xmlns="" w="9525">
                   <a:solidFill>
                     <a:srgbClr val="000000"/>
                   </a:solidFill>
@@ -3631,7 +3775,7 @@
             </a:ln>
             <a:extLst>
               <a:ext uri="{91240B29-F687-4f45-9708-019B960494DF}">
-                <a14:hiddenLine xmlns="" xmlns:a14="http://schemas.microsoft.com/office/drawing/2010/main" w="9525">
+                <a14:hiddenLine xmlns:a14="http://schemas.microsoft.com/office/drawing/2010/main" xmlns="" w="9525">
                   <a:solidFill>
                     <a:srgbClr val="000000"/>
                   </a:solidFill>
@@ -3721,7 +3865,7 @@
             </a:ln>
             <a:extLst>
               <a:ext uri="{91240B29-F687-4f45-9708-019B960494DF}">
-                <a14:hiddenLine xmlns="" xmlns:a14="http://schemas.microsoft.com/office/drawing/2010/main" w="9525">
+                <a14:hiddenLine xmlns:a14="http://schemas.microsoft.com/office/drawing/2010/main" xmlns="" w="9525">
                   <a:solidFill>
                     <a:srgbClr val="000000"/>
                   </a:solidFill>
@@ -3783,7 +3927,7 @@
             </a:ln>
             <a:extLst>
               <a:ext uri="{91240B29-F687-4f45-9708-019B960494DF}">
-                <a14:hiddenLine xmlns="" xmlns:a14="http://schemas.microsoft.com/office/drawing/2010/main" w="9525">
+                <a14:hiddenLine xmlns:a14="http://schemas.microsoft.com/office/drawing/2010/main" xmlns="" w="9525">
                   <a:solidFill>
                     <a:srgbClr val="000000"/>
                   </a:solidFill>
@@ -3873,7 +4017,7 @@
             </a:ln>
             <a:extLst>
               <a:ext uri="{91240B29-F687-4f45-9708-019B960494DF}">
-                <a14:hiddenLine xmlns="" xmlns:a14="http://schemas.microsoft.com/office/drawing/2010/main" w="9525">
+                <a14:hiddenLine xmlns:a14="http://schemas.microsoft.com/office/drawing/2010/main" xmlns="" w="9525">
                   <a:solidFill>
                     <a:srgbClr val="000000"/>
                   </a:solidFill>
@@ -3935,7 +4079,7 @@
             </a:ln>
             <a:extLst>
               <a:ext uri="{91240B29-F687-4f45-9708-019B960494DF}">
-                <a14:hiddenLine xmlns="" xmlns:a14="http://schemas.microsoft.com/office/drawing/2010/main" w="9525">
+                <a14:hiddenLine xmlns:a14="http://schemas.microsoft.com/office/drawing/2010/main" xmlns="" w="9525">
                   <a:solidFill>
                     <a:srgbClr val="000000"/>
                   </a:solidFill>
@@ -4025,7 +4169,7 @@
             </a:ln>
             <a:extLst>
               <a:ext uri="{91240B29-F687-4f45-9708-019B960494DF}">
-                <a14:hiddenLine xmlns="" xmlns:a14="http://schemas.microsoft.com/office/drawing/2010/main" w="9525">
+                <a14:hiddenLine xmlns:a14="http://schemas.microsoft.com/office/drawing/2010/main" xmlns="" w="9525">
                   <a:solidFill>
                     <a:srgbClr val="000000"/>
                   </a:solidFill>
@@ -4059,7 +4203,7 @@
             </a:ln>
             <a:extLst>
               <a:ext uri="{91240B29-F687-4f45-9708-019B960494DF}">
-                <a14:hiddenLine xmlns="" xmlns:a14="http://schemas.microsoft.com/office/drawing/2010/main" w="9525">
+                <a14:hiddenLine xmlns:a14="http://schemas.microsoft.com/office/drawing/2010/main" xmlns="" w="9525">
                   <a:solidFill>
                     <a:srgbClr val="000000"/>
                   </a:solidFill>
@@ -4124,7 +4268,7 @@
             </a:ln>
             <a:extLst>
               <a:ext uri="{91240B29-F687-4f45-9708-019B960494DF}">
-                <a14:hiddenLine xmlns="" xmlns:a14="http://schemas.microsoft.com/office/drawing/2010/main" w="9525">
+                <a14:hiddenLine xmlns:a14="http://schemas.microsoft.com/office/drawing/2010/main" xmlns="" w="9525">
                   <a:solidFill>
                     <a:srgbClr val="000000"/>
                   </a:solidFill>
@@ -4214,7 +4358,7 @@
             </a:ln>
             <a:extLst>
               <a:ext uri="{91240B29-F687-4f45-9708-019B960494DF}">
-                <a14:hiddenLine xmlns="" xmlns:a14="http://schemas.microsoft.com/office/drawing/2010/main" w="9525">
+                <a14:hiddenLine xmlns:a14="http://schemas.microsoft.com/office/drawing/2010/main" xmlns="" w="9525">
                   <a:solidFill>
                     <a:srgbClr val="000000"/>
                   </a:solidFill>
@@ -4276,7 +4420,7 @@
             </a:ln>
             <a:extLst>
               <a:ext uri="{91240B29-F687-4f45-9708-019B960494DF}">
-                <a14:hiddenLine xmlns="" xmlns:a14="http://schemas.microsoft.com/office/drawing/2010/main" w="9525">
+                <a14:hiddenLine xmlns:a14="http://schemas.microsoft.com/office/drawing/2010/main" xmlns="" w="9525">
                   <a:solidFill>
                     <a:srgbClr val="000000"/>
                   </a:solidFill>
@@ -4366,7 +4510,7 @@
             </a:ln>
             <a:extLst>
               <a:ext uri="{91240B29-F687-4f45-9708-019B960494DF}">
-                <a14:hiddenLine xmlns="" xmlns:a14="http://schemas.microsoft.com/office/drawing/2010/main" w="9525">
+                <a14:hiddenLine xmlns:a14="http://schemas.microsoft.com/office/drawing/2010/main" xmlns="" w="9525">
                   <a:solidFill>
                     <a:srgbClr val="000000"/>
                   </a:solidFill>
@@ -4456,7 +4600,7 @@
             </a:ln>
             <a:extLst>
               <a:ext uri="{91240B29-F687-4f45-9708-019B960494DF}">
-                <a14:hiddenLine xmlns="" xmlns:a14="http://schemas.microsoft.com/office/drawing/2010/main" w="9525">
+                <a14:hiddenLine xmlns:a14="http://schemas.microsoft.com/office/drawing/2010/main" xmlns="" w="9525">
                   <a:solidFill>
                     <a:srgbClr val="000000"/>
                   </a:solidFill>
@@ -4521,7 +4665,7 @@
             </a:ln>
             <a:extLst>
               <a:ext uri="{91240B29-F687-4f45-9708-019B960494DF}">
-                <a14:hiddenLine xmlns="" xmlns:a14="http://schemas.microsoft.com/office/drawing/2010/main" w="9525">
+                <a14:hiddenLine xmlns:a14="http://schemas.microsoft.com/office/drawing/2010/main" xmlns="" w="9525">
                   <a:solidFill>
                     <a:srgbClr val="000000"/>
                   </a:solidFill>
@@ -4583,7 +4727,7 @@
             </a:ln>
             <a:extLst>
               <a:ext uri="{91240B29-F687-4f45-9708-019B960494DF}">
-                <a14:hiddenLine xmlns="" xmlns:a14="http://schemas.microsoft.com/office/drawing/2010/main" w="9525">
+                <a14:hiddenLine xmlns:a14="http://schemas.microsoft.com/office/drawing/2010/main" xmlns="" w="9525">
                   <a:solidFill>
                     <a:srgbClr val="000000"/>
                   </a:solidFill>
@@ -4673,7 +4817,7 @@
             </a:ln>
             <a:extLst>
               <a:ext uri="{91240B29-F687-4f45-9708-019B960494DF}">
-                <a14:hiddenLine xmlns="" xmlns:a14="http://schemas.microsoft.com/office/drawing/2010/main" w="9525">
+                <a14:hiddenLine xmlns:a14="http://schemas.microsoft.com/office/drawing/2010/main" xmlns="" w="9525">
                   <a:solidFill>
                     <a:srgbClr val="000000"/>
                   </a:solidFill>
@@ -4763,7 +4907,7 @@
             </a:ln>
             <a:extLst>
               <a:ext uri="{91240B29-F687-4f45-9708-019B960494DF}">
-                <a14:hiddenLine xmlns="" xmlns:a14="http://schemas.microsoft.com/office/drawing/2010/main" w="9525">
+                <a14:hiddenLine xmlns:a14="http://schemas.microsoft.com/office/drawing/2010/main" xmlns="" w="9525">
                   <a:solidFill>
                     <a:srgbClr val="000000"/>
                   </a:solidFill>
@@ -4825,7 +4969,7 @@
             </a:ln>
             <a:extLst>
               <a:ext uri="{91240B29-F687-4f45-9708-019B960494DF}">
-                <a14:hiddenLine xmlns="" xmlns:a14="http://schemas.microsoft.com/office/drawing/2010/main" w="9525">
+                <a14:hiddenLine xmlns:a14="http://schemas.microsoft.com/office/drawing/2010/main" xmlns="" w="9525">
                   <a:solidFill>
                     <a:srgbClr val="000000"/>
                   </a:solidFill>
@@ -4945,7 +5089,7 @@
             </a:ln>
             <a:extLst>
               <a:ext uri="{91240B29-F687-4f45-9708-019B960494DF}">
-                <a14:hiddenLine xmlns="" xmlns:a14="http://schemas.microsoft.com/office/drawing/2010/main" w="9525">
+                <a14:hiddenLine xmlns:a14="http://schemas.microsoft.com/office/drawing/2010/main" xmlns="" w="9525">
                   <a:solidFill>
                     <a:srgbClr val="000000"/>
                   </a:solidFill>
@@ -5013,7 +5157,7 @@
             </a:ln>
             <a:extLst>
               <a:ext uri="{91240B29-F687-4f45-9708-019B960494DF}">
-                <a14:hiddenLine xmlns="" xmlns:a14="http://schemas.microsoft.com/office/drawing/2010/main" w="9525">
+                <a14:hiddenLine xmlns:a14="http://schemas.microsoft.com/office/drawing/2010/main" xmlns="" w="9525">
                   <a:solidFill>
                     <a:srgbClr val="000000"/>
                   </a:solidFill>
@@ -5103,7 +5247,7 @@
             </a:ln>
             <a:extLst>
               <a:ext uri="{91240B29-F687-4f45-9708-019B960494DF}">
-                <a14:hiddenLine xmlns="" xmlns:a14="http://schemas.microsoft.com/office/drawing/2010/main" w="9525">
+                <a14:hiddenLine xmlns:a14="http://schemas.microsoft.com/office/drawing/2010/main" xmlns="" w="9525">
                   <a:solidFill>
                     <a:srgbClr val="000000"/>
                   </a:solidFill>
@@ -9832,7 +9976,7 @@
           <a:noFill/>
           <a:extLst>
             <a:ext uri="{909E8E84-426E-40dd-AFC4-6F175D3DCCD1}">
-              <a14:hiddenFill xmlns="" xmlns:a14="http://schemas.microsoft.com/office/drawing/2010/main">
+              <a14:hiddenFill xmlns:a14="http://schemas.microsoft.com/office/drawing/2010/main" xmlns="">
                 <a:solidFill>
                   <a:srgbClr val="FFFFFF"/>
                 </a:solidFill>
@@ -9906,7 +10050,7 @@
               </a:ln>
               <a:extLst>
                 <a:ext uri="{91240B29-F687-4f45-9708-019B960494DF}">
-                  <a14:hiddenLine xmlns="" xmlns:a14="http://schemas.microsoft.com/office/drawing/2010/main" w="9525">
+                  <a14:hiddenLine xmlns:a14="http://schemas.microsoft.com/office/drawing/2010/main" xmlns="" w="9525">
                     <a:solidFill>
                       <a:srgbClr val="000000"/>
                     </a:solidFill>
@@ -9996,7 +10140,7 @@
               </a:ln>
               <a:extLst>
                 <a:ext uri="{91240B29-F687-4f45-9708-019B960494DF}">
-                  <a14:hiddenLine xmlns="" xmlns:a14="http://schemas.microsoft.com/office/drawing/2010/main" w="9525">
+                  <a14:hiddenLine xmlns:a14="http://schemas.microsoft.com/office/drawing/2010/main" xmlns="" w="9525">
                     <a:solidFill>
                       <a:srgbClr val="000000"/>
                     </a:solidFill>
@@ -10086,7 +10230,7 @@
               </a:ln>
               <a:extLst>
                 <a:ext uri="{91240B29-F687-4f45-9708-019B960494DF}">
-                  <a14:hiddenLine xmlns="" xmlns:a14="http://schemas.microsoft.com/office/drawing/2010/main" w="9525">
+                  <a14:hiddenLine xmlns:a14="http://schemas.microsoft.com/office/drawing/2010/main" xmlns="" w="9525">
                     <a:solidFill>
                       <a:srgbClr val="000000"/>
                     </a:solidFill>
@@ -10148,7 +10292,7 @@
               </a:ln>
               <a:extLst>
                 <a:ext uri="{91240B29-F687-4f45-9708-019B960494DF}">
-                  <a14:hiddenLine xmlns="" xmlns:a14="http://schemas.microsoft.com/office/drawing/2010/main" w="9525">
+                  <a14:hiddenLine xmlns:a14="http://schemas.microsoft.com/office/drawing/2010/main" xmlns="" w="9525">
                     <a:solidFill>
                       <a:srgbClr val="000000"/>
                     </a:solidFill>
@@ -10238,7 +10382,7 @@
               </a:ln>
               <a:extLst>
                 <a:ext uri="{91240B29-F687-4f45-9708-019B960494DF}">
-                  <a14:hiddenLine xmlns="" xmlns:a14="http://schemas.microsoft.com/office/drawing/2010/main" w="9525">
+                  <a14:hiddenLine xmlns:a14="http://schemas.microsoft.com/office/drawing/2010/main" xmlns="" w="9525">
                     <a:solidFill>
                       <a:srgbClr val="000000"/>
                     </a:solidFill>
@@ -10300,7 +10444,7 @@
               </a:ln>
               <a:extLst>
                 <a:ext uri="{91240B29-F687-4f45-9708-019B960494DF}">
-                  <a14:hiddenLine xmlns="" xmlns:a14="http://schemas.microsoft.com/office/drawing/2010/main" w="9525">
+                  <a14:hiddenLine xmlns:a14="http://schemas.microsoft.com/office/drawing/2010/main" xmlns="" w="9525">
                     <a:solidFill>
                       <a:srgbClr val="000000"/>
                     </a:solidFill>
@@ -10362,7 +10506,7 @@
               </a:ln>
               <a:extLst>
                 <a:ext uri="{91240B29-F687-4f45-9708-019B960494DF}">
-                  <a14:hiddenLine xmlns="" xmlns:a14="http://schemas.microsoft.com/office/drawing/2010/main" w="9525">
+                  <a14:hiddenLine xmlns:a14="http://schemas.microsoft.com/office/drawing/2010/main" xmlns="" w="9525">
                     <a:solidFill>
                       <a:srgbClr val="000000"/>
                     </a:solidFill>
@@ -10452,7 +10596,7 @@
               </a:ln>
               <a:extLst>
                 <a:ext uri="{91240B29-F687-4f45-9708-019B960494DF}">
-                  <a14:hiddenLine xmlns="" xmlns:a14="http://schemas.microsoft.com/office/drawing/2010/main" w="9525">
+                  <a14:hiddenLine xmlns:a14="http://schemas.microsoft.com/office/drawing/2010/main" xmlns="" w="9525">
                     <a:solidFill>
                       <a:srgbClr val="000000"/>
                     </a:solidFill>
@@ -10542,7 +10686,7 @@
               </a:ln>
               <a:extLst>
                 <a:ext uri="{91240B29-F687-4f45-9708-019B960494DF}">
-                  <a14:hiddenLine xmlns="" xmlns:a14="http://schemas.microsoft.com/office/drawing/2010/main" w="9525">
+                  <a14:hiddenLine xmlns:a14="http://schemas.microsoft.com/office/drawing/2010/main" xmlns="" w="9525">
                     <a:solidFill>
                       <a:srgbClr val="000000"/>
                     </a:solidFill>
@@ -10604,7 +10748,7 @@
               </a:ln>
               <a:extLst>
                 <a:ext uri="{91240B29-F687-4f45-9708-019B960494DF}">
-                  <a14:hiddenLine xmlns="" xmlns:a14="http://schemas.microsoft.com/office/drawing/2010/main" w="9525">
+                  <a14:hiddenLine xmlns:a14="http://schemas.microsoft.com/office/drawing/2010/main" xmlns="" w="9525">
                     <a:solidFill>
                       <a:srgbClr val="000000"/>
                     </a:solidFill>
@@ -10714,7 +10858,7 @@
               </a:ln>
               <a:extLst>
                 <a:ext uri="{91240B29-F687-4f45-9708-019B960494DF}">
-                  <a14:hiddenLine xmlns="" xmlns:a14="http://schemas.microsoft.com/office/drawing/2010/main" w="9525">
+                  <a14:hiddenLine xmlns:a14="http://schemas.microsoft.com/office/drawing/2010/main" xmlns="" w="9525">
                     <a:solidFill>
                       <a:srgbClr val="000000"/>
                     </a:solidFill>
@@ -10798,7 +10942,7 @@
               </a:ln>
               <a:extLst>
                 <a:ext uri="{91240B29-F687-4f45-9708-019B960494DF}">
-                  <a14:hiddenLine xmlns="" xmlns:a14="http://schemas.microsoft.com/office/drawing/2010/main" w="9525">
+                  <a14:hiddenLine xmlns:a14="http://schemas.microsoft.com/office/drawing/2010/main" xmlns="" w="9525">
                     <a:solidFill>
                       <a:srgbClr val="000000"/>
                     </a:solidFill>
@@ -10860,7 +11004,7 @@
               </a:ln>
               <a:extLst>
                 <a:ext uri="{91240B29-F687-4f45-9708-019B960494DF}">
-                  <a14:hiddenLine xmlns="" xmlns:a14="http://schemas.microsoft.com/office/drawing/2010/main" w="9525">
+                  <a14:hiddenLine xmlns:a14="http://schemas.microsoft.com/office/drawing/2010/main" xmlns="" w="9525">
                     <a:solidFill>
                       <a:srgbClr val="000000"/>
                     </a:solidFill>
@@ -10922,7 +11066,7 @@
               </a:ln>
               <a:extLst>
                 <a:ext uri="{91240B29-F687-4f45-9708-019B960494DF}">
-                  <a14:hiddenLine xmlns="" xmlns:a14="http://schemas.microsoft.com/office/drawing/2010/main" w="9525">
+                  <a14:hiddenLine xmlns:a14="http://schemas.microsoft.com/office/drawing/2010/main" xmlns="" w="9525">
                     <a:solidFill>
                       <a:srgbClr val="000000"/>
                     </a:solidFill>
@@ -11012,7 +11156,7 @@
               </a:ln>
               <a:extLst>
                 <a:ext uri="{91240B29-F687-4f45-9708-019B960494DF}">
-                  <a14:hiddenLine xmlns="" xmlns:a14="http://schemas.microsoft.com/office/drawing/2010/main" w="9525">
+                  <a14:hiddenLine xmlns:a14="http://schemas.microsoft.com/office/drawing/2010/main" xmlns="" w="9525">
                     <a:solidFill>
                       <a:srgbClr val="000000"/>
                     </a:solidFill>
@@ -11046,7 +11190,7 @@
               </a:ln>
               <a:extLst>
                 <a:ext uri="{91240B29-F687-4f45-9708-019B960494DF}">
-                  <a14:hiddenLine xmlns="" xmlns:a14="http://schemas.microsoft.com/office/drawing/2010/main" w="9525">
+                  <a14:hiddenLine xmlns:a14="http://schemas.microsoft.com/office/drawing/2010/main" xmlns="" w="9525">
                     <a:solidFill>
                       <a:srgbClr val="000000"/>
                     </a:solidFill>
@@ -11111,7 +11255,7 @@
               </a:ln>
               <a:extLst>
                 <a:ext uri="{91240B29-F687-4f45-9708-019B960494DF}">
-                  <a14:hiddenLine xmlns="" xmlns:a14="http://schemas.microsoft.com/office/drawing/2010/main" w="9525">
+                  <a14:hiddenLine xmlns:a14="http://schemas.microsoft.com/office/drawing/2010/main" xmlns="" w="9525">
                     <a:solidFill>
                       <a:srgbClr val="000000"/>
                     </a:solidFill>
@@ -11201,7 +11345,7 @@
               </a:ln>
               <a:extLst>
                 <a:ext uri="{91240B29-F687-4f45-9708-019B960494DF}">
-                  <a14:hiddenLine xmlns="" xmlns:a14="http://schemas.microsoft.com/office/drawing/2010/main" w="9525">
+                  <a14:hiddenLine xmlns:a14="http://schemas.microsoft.com/office/drawing/2010/main" xmlns="" w="9525">
                     <a:solidFill>
                       <a:srgbClr val="000000"/>
                     </a:solidFill>
@@ -11263,7 +11407,7 @@
               </a:ln>
               <a:extLst>
                 <a:ext uri="{91240B29-F687-4f45-9708-019B960494DF}">
-                  <a14:hiddenLine xmlns="" xmlns:a14="http://schemas.microsoft.com/office/drawing/2010/main" w="9525">
+                  <a14:hiddenLine xmlns:a14="http://schemas.microsoft.com/office/drawing/2010/main" xmlns="" w="9525">
                     <a:solidFill>
                       <a:srgbClr val="000000"/>
                     </a:solidFill>
@@ -11353,7 +11497,7 @@
               </a:ln>
               <a:extLst>
                 <a:ext uri="{91240B29-F687-4f45-9708-019B960494DF}">
-                  <a14:hiddenLine xmlns="" xmlns:a14="http://schemas.microsoft.com/office/drawing/2010/main" w="9525">
+                  <a14:hiddenLine xmlns:a14="http://schemas.microsoft.com/office/drawing/2010/main" xmlns="" w="9525">
                     <a:solidFill>
                       <a:srgbClr val="000000"/>
                     </a:solidFill>
@@ -11418,7 +11562,7 @@
               </a:ln>
               <a:extLst>
                 <a:ext uri="{91240B29-F687-4f45-9708-019B960494DF}">
-                  <a14:hiddenLine xmlns="" xmlns:a14="http://schemas.microsoft.com/office/drawing/2010/main" w="9525">
+                  <a14:hiddenLine xmlns:a14="http://schemas.microsoft.com/office/drawing/2010/main" xmlns="" w="9525">
                     <a:solidFill>
                       <a:srgbClr val="000000"/>
                     </a:solidFill>
@@ -11480,7 +11624,7 @@
               </a:ln>
               <a:extLst>
                 <a:ext uri="{91240B29-F687-4f45-9708-019B960494DF}">
-                  <a14:hiddenLine xmlns="" xmlns:a14="http://schemas.microsoft.com/office/drawing/2010/main" w="9525">
+                  <a14:hiddenLine xmlns:a14="http://schemas.microsoft.com/office/drawing/2010/main" xmlns="" w="9525">
                     <a:solidFill>
                       <a:srgbClr val="000000"/>
                     </a:solidFill>
@@ -11570,7 +11714,7 @@
               </a:ln>
               <a:extLst>
                 <a:ext uri="{91240B29-F687-4f45-9708-019B960494DF}">
-                  <a14:hiddenLine xmlns="" xmlns:a14="http://schemas.microsoft.com/office/drawing/2010/main" w="9525">
+                  <a14:hiddenLine xmlns:a14="http://schemas.microsoft.com/office/drawing/2010/main" xmlns="" w="9525">
                     <a:solidFill>
                       <a:srgbClr val="000000"/>
                     </a:solidFill>
@@ -11660,7 +11804,7 @@
               </a:ln>
               <a:extLst>
                 <a:ext uri="{91240B29-F687-4f45-9708-019B960494DF}">
-                  <a14:hiddenLine xmlns="" xmlns:a14="http://schemas.microsoft.com/office/drawing/2010/main" w="9525">
+                  <a14:hiddenLine xmlns:a14="http://schemas.microsoft.com/office/drawing/2010/main" xmlns="" w="9525">
                     <a:solidFill>
                       <a:srgbClr val="000000"/>
                     </a:solidFill>
@@ -11725,7 +11869,7 @@
               </a:ln>
               <a:extLst>
                 <a:ext uri="{91240B29-F687-4f45-9708-019B960494DF}">
-                  <a14:hiddenLine xmlns="" xmlns:a14="http://schemas.microsoft.com/office/drawing/2010/main" w="9525">
+                  <a14:hiddenLine xmlns:a14="http://schemas.microsoft.com/office/drawing/2010/main" xmlns="" w="9525">
                     <a:solidFill>
                       <a:srgbClr val="000000"/>
                     </a:solidFill>
@@ -11845,7 +11989,7 @@
               </a:ln>
               <a:extLst>
                 <a:ext uri="{91240B29-F687-4f45-9708-019B960494DF}">
-                  <a14:hiddenLine xmlns="" xmlns:a14="http://schemas.microsoft.com/office/drawing/2010/main" w="9525">
+                  <a14:hiddenLine xmlns:a14="http://schemas.microsoft.com/office/drawing/2010/main" xmlns="" w="9525">
                     <a:solidFill>
                       <a:srgbClr val="000000"/>
                     </a:solidFill>
@@ -11926,7 +12070,7 @@
               </a:ln>
               <a:extLst>
                 <a:ext uri="{91240B29-F687-4f45-9708-019B960494DF}">
-                  <a14:hiddenLine xmlns="" xmlns:a14="http://schemas.microsoft.com/office/drawing/2010/main" w="9525">
+                  <a14:hiddenLine xmlns:a14="http://schemas.microsoft.com/office/drawing/2010/main" xmlns="" w="9525">
                     <a:solidFill>
                       <a:srgbClr val="000000"/>
                     </a:solidFill>
@@ -12041,7 +12185,7 @@
               </a:ln>
               <a:extLst>
                 <a:ext uri="{91240B29-F687-4f45-9708-019B960494DF}">
-                  <a14:hiddenLine xmlns="" xmlns:a14="http://schemas.microsoft.com/office/drawing/2010/main" w="9525">
+                  <a14:hiddenLine xmlns:a14="http://schemas.microsoft.com/office/drawing/2010/main" xmlns="" w="9525">
                     <a:solidFill>
                       <a:srgbClr val="000000"/>
                     </a:solidFill>
@@ -12131,7 +12275,7 @@
               </a:ln>
               <a:extLst>
                 <a:ext uri="{91240B29-F687-4f45-9708-019B960494DF}">
-                  <a14:hiddenLine xmlns="" xmlns:a14="http://schemas.microsoft.com/office/drawing/2010/main" w="9525">
+                  <a14:hiddenLine xmlns:a14="http://schemas.microsoft.com/office/drawing/2010/main" xmlns="" w="9525">
                     <a:solidFill>
                       <a:srgbClr val="000000"/>
                     </a:solidFill>
@@ -12196,7 +12340,7 @@
               </a:ln>
               <a:extLst>
                 <a:ext uri="{91240B29-F687-4f45-9708-019B960494DF}">
-                  <a14:hiddenLine xmlns="" xmlns:a14="http://schemas.microsoft.com/office/drawing/2010/main" w="9525">
+                  <a14:hiddenLine xmlns:a14="http://schemas.microsoft.com/office/drawing/2010/main" xmlns="" w="9525">
                     <a:solidFill>
                       <a:srgbClr val="000000"/>
                     </a:solidFill>
@@ -12286,7 +12430,7 @@
               </a:ln>
               <a:extLst>
                 <a:ext uri="{91240B29-F687-4f45-9708-019B960494DF}">
-                  <a14:hiddenLine xmlns="" xmlns:a14="http://schemas.microsoft.com/office/drawing/2010/main" w="9525">
+                  <a14:hiddenLine xmlns:a14="http://schemas.microsoft.com/office/drawing/2010/main" xmlns="" w="9525">
                     <a:solidFill>
                       <a:srgbClr val="000000"/>
                     </a:solidFill>
@@ -12354,7 +12498,7 @@
               </a:ln>
               <a:extLst>
                 <a:ext uri="{91240B29-F687-4f45-9708-019B960494DF}">
-                  <a14:hiddenLine xmlns="" xmlns:a14="http://schemas.microsoft.com/office/drawing/2010/main" w="9525">
+                  <a14:hiddenLine xmlns:a14="http://schemas.microsoft.com/office/drawing/2010/main" xmlns="" w="9525">
                     <a:solidFill>
                       <a:srgbClr val="000000"/>
                     </a:solidFill>
@@ -12444,7 +12588,7 @@
               </a:ln>
               <a:extLst>
                 <a:ext uri="{91240B29-F687-4f45-9708-019B960494DF}">
-                  <a14:hiddenLine xmlns="" xmlns:a14="http://schemas.microsoft.com/office/drawing/2010/main" w="9525">
+                  <a14:hiddenLine xmlns:a14="http://schemas.microsoft.com/office/drawing/2010/main" xmlns="" w="9525">
                     <a:solidFill>
                       <a:srgbClr val="000000"/>
                     </a:solidFill>
@@ -12512,7 +12656,7 @@
               </a:ln>
               <a:extLst>
                 <a:ext uri="{91240B29-F687-4f45-9708-019B960494DF}">
-                  <a14:hiddenLine xmlns="" xmlns:a14="http://schemas.microsoft.com/office/drawing/2010/main" w="9525">
+                  <a14:hiddenLine xmlns:a14="http://schemas.microsoft.com/office/drawing/2010/main" xmlns="" w="9525">
                     <a:solidFill>
                       <a:srgbClr val="000000"/>
                     </a:solidFill>
@@ -12602,7 +12746,7 @@
               </a:ln>
               <a:extLst>
                 <a:ext uri="{91240B29-F687-4f45-9708-019B960494DF}">
-                  <a14:hiddenLine xmlns="" xmlns:a14="http://schemas.microsoft.com/office/drawing/2010/main" w="9525">
+                  <a14:hiddenLine xmlns:a14="http://schemas.microsoft.com/office/drawing/2010/main" xmlns="" w="9525">
                     <a:solidFill>
                       <a:srgbClr val="000000"/>
                     </a:solidFill>
@@ -12636,7 +12780,7 @@
               </a:ln>
               <a:extLst>
                 <a:ext uri="{91240B29-F687-4f45-9708-019B960494DF}">
-                  <a14:hiddenLine xmlns="" xmlns:a14="http://schemas.microsoft.com/office/drawing/2010/main" w="9525">
+                  <a14:hiddenLine xmlns:a14="http://schemas.microsoft.com/office/drawing/2010/main" xmlns="" w="9525">
                     <a:solidFill>
                       <a:srgbClr val="000000"/>
                     </a:solidFill>
@@ -13457,31 +13601,36 @@
           </a:p>
         </p:txBody>
       </p:sp>
-      <p:sp>
-        <p:nvSpPr>
-          <p:cNvPr id="5" name="Content Placeholder 4">
+      <p:pic>
+        <p:nvPicPr>
+          <p:cNvPr id="3" name="Picture 2">
             <a:extLst>
               <a:ext uri="{FF2B5EF4-FFF2-40B4-BE49-F238E27FC236}">
-                <a16:creationId xmlns:a16="http://schemas.microsoft.com/office/drawing/2014/main" id="{74298C96-E98E-4997-BAB8-CBBCE5A103DF}"/>
+                <a16:creationId xmlns:a16="http://schemas.microsoft.com/office/drawing/2014/main" id="{6967FF96-3346-4B11-BB9F-9F2EFA64320F}"/>
               </a:ext>
             </a:extLst>
           </p:cNvPr>
-          <p:cNvSpPr>
-            <a:spLocks noGrp="1"/>
-          </p:cNvSpPr>
-          <p:nvPr>
-            <p:ph idx="1"/>
-          </p:nvPr>
-        </p:nvSpPr>
-        <p:spPr/>
-        <p:txBody>
-          <a:bodyPr/>
-          <a:lstStyle/>
-          <a:p>
-            <a:endParaRPr lang="en-US"/>
-          </a:p>
-        </p:txBody>
-      </p:sp>
+          <p:cNvPicPr>
+            <a:picLocks noChangeAspect="1"/>
+          </p:cNvPicPr>
+          <p:nvPr/>
+        </p:nvPicPr>
+        <p:blipFill>
+          <a:blip r:embed="rId3"/>
+          <a:stretch>
+            <a:fillRect/>
+          </a:stretch>
+        </p:blipFill>
+        <p:spPr>
+          <a:xfrm>
+            <a:off x="1227741" y="2461037"/>
+            <a:ext cx="9736518" cy="3165775"/>
+          </a:xfrm>
+          <a:prstGeom prst="rect">
+            <a:avLst/>
+          </a:prstGeom>
+        </p:spPr>
+      </p:pic>
     </p:spTree>
     <p:extLst>
       <p:ext uri="{BB962C8B-B14F-4D97-AF65-F5344CB8AC3E}">
@@ -13545,6 +13694,156 @@
           </a:p>
         </p:txBody>
       </p:sp>
+      <p:pic>
+        <p:nvPicPr>
+          <p:cNvPr id="3" name="Picture 2">
+            <a:extLst>
+              <a:ext uri="{FF2B5EF4-FFF2-40B4-BE49-F238E27FC236}">
+                <a16:creationId xmlns:a16="http://schemas.microsoft.com/office/drawing/2014/main" id="{A4E1F039-8C0C-4269-830F-880D5221E15B}"/>
+              </a:ext>
+            </a:extLst>
+          </p:cNvPr>
+          <p:cNvPicPr>
+            <a:picLocks noChangeAspect="1"/>
+          </p:cNvPicPr>
+          <p:nvPr/>
+        </p:nvPicPr>
+        <p:blipFill>
+          <a:blip r:embed="rId3"/>
+          <a:stretch>
+            <a:fillRect/>
+          </a:stretch>
+        </p:blipFill>
+        <p:spPr>
+          <a:xfrm>
+            <a:off x="1261730" y="1387227"/>
+            <a:ext cx="2086818" cy="838539"/>
+          </a:xfrm>
+          <a:prstGeom prst="rect">
+            <a:avLst/>
+          </a:prstGeom>
+        </p:spPr>
+      </p:pic>
+      <p:pic>
+        <p:nvPicPr>
+          <p:cNvPr id="4" name="Picture 3">
+            <a:extLst>
+              <a:ext uri="{FF2B5EF4-FFF2-40B4-BE49-F238E27FC236}">
+                <a16:creationId xmlns:a16="http://schemas.microsoft.com/office/drawing/2014/main" id="{496974E2-9292-4EAB-8E82-E5FFEFDE0842}"/>
+              </a:ext>
+            </a:extLst>
+          </p:cNvPr>
+          <p:cNvPicPr>
+            <a:picLocks noChangeAspect="1"/>
+          </p:cNvPicPr>
+          <p:nvPr/>
+        </p:nvPicPr>
+        <p:blipFill>
+          <a:blip r:embed="rId4"/>
+          <a:stretch>
+            <a:fillRect/>
+          </a:stretch>
+        </p:blipFill>
+        <p:spPr>
+          <a:xfrm>
+            <a:off x="1261730" y="2650234"/>
+            <a:ext cx="3430387" cy="1982001"/>
+          </a:xfrm>
+          <a:prstGeom prst="rect">
+            <a:avLst/>
+          </a:prstGeom>
+        </p:spPr>
+      </p:pic>
+      <p:pic>
+        <p:nvPicPr>
+          <p:cNvPr id="5" name="Picture 4">
+            <a:extLst>
+              <a:ext uri="{FF2B5EF4-FFF2-40B4-BE49-F238E27FC236}">
+                <a16:creationId xmlns:a16="http://schemas.microsoft.com/office/drawing/2014/main" id="{E08A0E29-2DE6-4B05-BE8B-AA63E7237A59}"/>
+              </a:ext>
+            </a:extLst>
+          </p:cNvPr>
+          <p:cNvPicPr>
+            <a:picLocks noChangeAspect="1"/>
+          </p:cNvPicPr>
+          <p:nvPr/>
+        </p:nvPicPr>
+        <p:blipFill>
+          <a:blip r:embed="rId5"/>
+          <a:stretch>
+            <a:fillRect/>
+          </a:stretch>
+        </p:blipFill>
+        <p:spPr>
+          <a:xfrm>
+            <a:off x="5470240" y="1320525"/>
+            <a:ext cx="2029645" cy="1810482"/>
+          </a:xfrm>
+          <a:prstGeom prst="rect">
+            <a:avLst/>
+          </a:prstGeom>
+        </p:spPr>
+      </p:pic>
+      <p:pic>
+        <p:nvPicPr>
+          <p:cNvPr id="6" name="Picture 5">
+            <a:extLst>
+              <a:ext uri="{FF2B5EF4-FFF2-40B4-BE49-F238E27FC236}">
+                <a16:creationId xmlns:a16="http://schemas.microsoft.com/office/drawing/2014/main" id="{E5BC25D4-DC0E-4FA3-813F-AF1A355E2AA5}"/>
+              </a:ext>
+            </a:extLst>
+          </p:cNvPr>
+          <p:cNvPicPr>
+            <a:picLocks noChangeAspect="1"/>
+          </p:cNvPicPr>
+          <p:nvPr/>
+        </p:nvPicPr>
+        <p:blipFill>
+          <a:blip r:embed="rId6"/>
+          <a:stretch>
+            <a:fillRect/>
+          </a:stretch>
+        </p:blipFill>
+        <p:spPr>
+          <a:xfrm>
+            <a:off x="8112054" y="1315038"/>
+            <a:ext cx="3259730" cy="1782367"/>
+          </a:xfrm>
+          <a:prstGeom prst="rect">
+            <a:avLst/>
+          </a:prstGeom>
+        </p:spPr>
+      </p:pic>
+      <p:pic>
+        <p:nvPicPr>
+          <p:cNvPr id="7" name="Picture 6">
+            <a:extLst>
+              <a:ext uri="{FF2B5EF4-FFF2-40B4-BE49-F238E27FC236}">
+                <a16:creationId xmlns:a16="http://schemas.microsoft.com/office/drawing/2014/main" id="{F4A4BCB9-932B-467C-89DE-28E787227A01}"/>
+              </a:ext>
+            </a:extLst>
+          </p:cNvPr>
+          <p:cNvPicPr>
+            <a:picLocks noChangeAspect="1"/>
+          </p:cNvPicPr>
+          <p:nvPr/>
+        </p:nvPicPr>
+        <p:blipFill>
+          <a:blip r:embed="rId7"/>
+          <a:stretch>
+            <a:fillRect/>
+          </a:stretch>
+        </p:blipFill>
+        <p:spPr>
+          <a:xfrm>
+            <a:off x="6214729" y="3400602"/>
+            <a:ext cx="3935416" cy="2944415"/>
+          </a:xfrm>
+          <a:prstGeom prst="rect">
+            <a:avLst/>
+          </a:prstGeom>
+        </p:spPr>
+      </p:pic>
     </p:spTree>
     <p:extLst>
       <p:ext uri="{BB962C8B-B14F-4D97-AF65-F5344CB8AC3E}">
@@ -13555,6 +13854,216 @@
   <p:clrMapOvr>
     <a:masterClrMapping/>
   </p:clrMapOvr>
+  <p:timing>
+    <p:tnLst>
+      <p:par>
+        <p:cTn id="1" dur="indefinite" restart="never" nodeType="tmRoot">
+          <p:childTnLst>
+            <p:seq concurrent="1" nextAc="seek">
+              <p:cTn id="2" dur="indefinite" nodeType="mainSeq">
+                <p:childTnLst>
+                  <p:par>
+                    <p:cTn id="3" fill="hold">
+                      <p:stCondLst>
+                        <p:cond delay="indefinite"/>
+                      </p:stCondLst>
+                      <p:childTnLst>
+                        <p:par>
+                          <p:cTn id="4" fill="hold">
+                            <p:stCondLst>
+                              <p:cond delay="0"/>
+                            </p:stCondLst>
+                            <p:childTnLst>
+                              <p:par>
+                                <p:cTn id="5" presetID="1" presetClass="entr" presetSubtype="0" fill="hold" nodeType="clickEffect">
+                                  <p:stCondLst>
+                                    <p:cond delay="0"/>
+                                  </p:stCondLst>
+                                  <p:childTnLst>
+                                    <p:set>
+                                      <p:cBhvr>
+                                        <p:cTn id="6" dur="1" fill="hold">
+                                          <p:stCondLst>
+                                            <p:cond delay="0"/>
+                                          </p:stCondLst>
+                                        </p:cTn>
+                                        <p:tgtEl>
+                                          <p:spTgt spid="4"/>
+                                        </p:tgtEl>
+                                        <p:attrNameLst>
+                                          <p:attrName>style.visibility</p:attrName>
+                                        </p:attrNameLst>
+                                      </p:cBhvr>
+                                      <p:to>
+                                        <p:strVal val="visible"/>
+                                      </p:to>
+                                    </p:set>
+                                  </p:childTnLst>
+                                </p:cTn>
+                              </p:par>
+                            </p:childTnLst>
+                          </p:cTn>
+                        </p:par>
+                      </p:childTnLst>
+                    </p:cTn>
+                  </p:par>
+                  <p:par>
+                    <p:cTn id="7" fill="hold">
+                      <p:stCondLst>
+                        <p:cond delay="indefinite"/>
+                      </p:stCondLst>
+                      <p:childTnLst>
+                        <p:par>
+                          <p:cTn id="8" fill="hold">
+                            <p:stCondLst>
+                              <p:cond delay="0"/>
+                            </p:stCondLst>
+                            <p:childTnLst>
+                              <p:par>
+                                <p:cTn id="9" presetID="1" presetClass="entr" presetSubtype="0" fill="hold" nodeType="clickEffect">
+                                  <p:stCondLst>
+                                    <p:cond delay="0"/>
+                                  </p:stCondLst>
+                                  <p:childTnLst>
+                                    <p:set>
+                                      <p:cBhvr>
+                                        <p:cTn id="10" dur="1" fill="hold">
+                                          <p:stCondLst>
+                                            <p:cond delay="0"/>
+                                          </p:stCondLst>
+                                        </p:cTn>
+                                        <p:tgtEl>
+                                          <p:spTgt spid="5"/>
+                                        </p:tgtEl>
+                                        <p:attrNameLst>
+                                          <p:attrName>style.visibility</p:attrName>
+                                        </p:attrNameLst>
+                                      </p:cBhvr>
+                                      <p:to>
+                                        <p:strVal val="visible"/>
+                                      </p:to>
+                                    </p:set>
+                                  </p:childTnLst>
+                                </p:cTn>
+                              </p:par>
+                            </p:childTnLst>
+                          </p:cTn>
+                        </p:par>
+                      </p:childTnLst>
+                    </p:cTn>
+                  </p:par>
+                  <p:par>
+                    <p:cTn id="11" fill="hold">
+                      <p:stCondLst>
+                        <p:cond delay="indefinite"/>
+                      </p:stCondLst>
+                      <p:childTnLst>
+                        <p:par>
+                          <p:cTn id="12" fill="hold">
+                            <p:stCondLst>
+                              <p:cond delay="0"/>
+                            </p:stCondLst>
+                            <p:childTnLst>
+                              <p:par>
+                                <p:cTn id="13" presetID="1" presetClass="entr" presetSubtype="0" fill="hold" nodeType="clickEffect">
+                                  <p:stCondLst>
+                                    <p:cond delay="0"/>
+                                  </p:stCondLst>
+                                  <p:childTnLst>
+                                    <p:set>
+                                      <p:cBhvr>
+                                        <p:cTn id="14" dur="1" fill="hold">
+                                          <p:stCondLst>
+                                            <p:cond delay="0"/>
+                                          </p:stCondLst>
+                                        </p:cTn>
+                                        <p:tgtEl>
+                                          <p:spTgt spid="6"/>
+                                        </p:tgtEl>
+                                        <p:attrNameLst>
+                                          <p:attrName>style.visibility</p:attrName>
+                                        </p:attrNameLst>
+                                      </p:cBhvr>
+                                      <p:to>
+                                        <p:strVal val="visible"/>
+                                      </p:to>
+                                    </p:set>
+                                  </p:childTnLst>
+                                </p:cTn>
+                              </p:par>
+                            </p:childTnLst>
+                          </p:cTn>
+                        </p:par>
+                      </p:childTnLst>
+                    </p:cTn>
+                  </p:par>
+                  <p:par>
+                    <p:cTn id="15" fill="hold">
+                      <p:stCondLst>
+                        <p:cond delay="indefinite"/>
+                      </p:stCondLst>
+                      <p:childTnLst>
+                        <p:par>
+                          <p:cTn id="16" fill="hold">
+                            <p:stCondLst>
+                              <p:cond delay="0"/>
+                            </p:stCondLst>
+                            <p:childTnLst>
+                              <p:par>
+                                <p:cTn id="17" presetID="1" presetClass="entr" presetSubtype="0" fill="hold" nodeType="clickEffect">
+                                  <p:stCondLst>
+                                    <p:cond delay="0"/>
+                                  </p:stCondLst>
+                                  <p:childTnLst>
+                                    <p:set>
+                                      <p:cBhvr>
+                                        <p:cTn id="18" dur="1" fill="hold">
+                                          <p:stCondLst>
+                                            <p:cond delay="0"/>
+                                          </p:stCondLst>
+                                        </p:cTn>
+                                        <p:tgtEl>
+                                          <p:spTgt spid="7"/>
+                                        </p:tgtEl>
+                                        <p:attrNameLst>
+                                          <p:attrName>style.visibility</p:attrName>
+                                        </p:attrNameLst>
+                                      </p:cBhvr>
+                                      <p:to>
+                                        <p:strVal val="visible"/>
+                                      </p:to>
+                                    </p:set>
+                                  </p:childTnLst>
+                                </p:cTn>
+                              </p:par>
+                            </p:childTnLst>
+                          </p:cTn>
+                        </p:par>
+                      </p:childTnLst>
+                    </p:cTn>
+                  </p:par>
+                </p:childTnLst>
+              </p:cTn>
+              <p:prevCondLst>
+                <p:cond evt="onPrev" delay="0">
+                  <p:tgtEl>
+                    <p:sldTgt/>
+                  </p:tgtEl>
+                </p:cond>
+              </p:prevCondLst>
+              <p:nextCondLst>
+                <p:cond evt="onNext" delay="0">
+                  <p:tgtEl>
+                    <p:sldTgt/>
+                  </p:tgtEl>
+                </p:cond>
+              </p:nextCondLst>
+            </p:seq>
+          </p:childTnLst>
+        </p:cTn>
+      </p:par>
+    </p:tnLst>
+  </p:timing>
 </p:sld>
 </file>
 
@@ -13624,7 +14133,22 @@
           <a:bodyPr/>
           <a:lstStyle/>
           <a:p>
-            <a:endParaRPr lang="en-US"/>
+            <a:r>
+              <a:rPr lang="en-US" dirty="0"/>
+              <a:t>In the command pattern, are requests encapsulated as objects?</a:t>
+            </a:r>
+          </a:p>
+          <a:p>
+            <a:r>
+              <a:rPr lang="en-US" dirty="0"/>
+              <a:t>Is the command created and executed by the same class?</a:t>
+            </a:r>
+          </a:p>
+          <a:p>
+            <a:r>
+              <a:rPr lang="en-US" dirty="0"/>
+              <a:t>What is the role of the receiver?</a:t>
+            </a:r>
           </a:p>
         </p:txBody>
       </p:sp>
@@ -13713,6 +14237,27 @@
               </a:rPr>
               <a:t>https://sourcemaking.com/design_patterns/command</a:t>
             </a:r>
+            <a:endParaRPr lang="en-US" dirty="0"/>
+          </a:p>
+          <a:p>
+            <a:r>
+              <a:rPr lang="en-US" dirty="0">
+                <a:hlinkClick r:id="rId4"/>
+              </a:rPr>
+              <a:t>https://www.oodesign.com/command-pattern.html</a:t>
+            </a:r>
+            <a:endParaRPr lang="en-US" dirty="0"/>
+          </a:p>
+          <a:p>
+            <a:r>
+              <a:rPr lang="en-US" dirty="0">
+                <a:hlinkClick r:id="rId5"/>
+              </a:rPr>
+              <a:t>https://dzone.com/articles/design-patterns-command</a:t>
+            </a:r>
+            <a:endParaRPr lang="en-US" dirty="0"/>
+          </a:p>
+          <a:p>
             <a:endParaRPr lang="en-US" dirty="0"/>
           </a:p>
         </p:txBody>

</xml_diff>